<commit_message>
Beschreibung des dritten Tages
</commit_message>
<xml_diff>
--- a/Präsentationen/Pycharm.pptx
+++ b/Präsentationen/Pycharm.pptx
@@ -308,7 +308,7 @@
                   <a:schemeClr val="tx2"/>
                 </a:solidFill>
               </a:rPr>
-              <a:t>05.02.2019</a:t>
+              <a:t>13.03.2019</a:t>
             </a:fld>
             <a:endParaRPr lang="de-DE">
               <a:solidFill>
@@ -658,7 +658,7 @@
             <a:fld id="{B4113CCE-1A1A-46DB-884A-AE560F65C3AF}" type="datetimeFigureOut">
               <a:rPr lang="de-DE" smtClean="0"/>
               <a:pPr/>
-              <a:t>05.02.2019</a:t>
+              <a:t>13.03.2019</a:t>
             </a:fld>
             <a:endParaRPr lang="de-DE"/>
           </a:p>
@@ -3978,19 +3978,11 @@
           <a:p>
             <a:r>
               <a:rPr lang="de-DE" dirty="0" smtClean="0"/>
-              <a:t>Die derzeit (</a:t>
-            </a:r>
-            <a:r>
-              <a:rPr lang="de-DE" dirty="0" smtClean="0"/>
-              <a:t>2019-02-05)</a:t>
+              <a:t>Die derzeit (2019-02-05)</a:t>
             </a:r>
             <a:r>
               <a:rPr lang="de-DE" baseline="0" dirty="0" smtClean="0"/>
-              <a:t> </a:t>
-            </a:r>
-            <a:r>
-              <a:rPr lang="de-DE" baseline="0" dirty="0" smtClean="0"/>
-              <a:t>aktuelle Version von </a:t>
+              <a:t> aktuelle Version von </a:t>
             </a:r>
             <a:r>
               <a:rPr lang="de-DE" baseline="0" dirty="0" err="1" smtClean="0"/>
@@ -4030,20 +4022,11 @@
               <a:rPr lang="de-DE" baseline="0" dirty="0" smtClean="0"/>
               <a:t> -version)</a:t>
             </a:r>
-            <a:endParaRPr lang="de-DE" baseline="0" dirty="0" smtClean="0"/>
           </a:p>
           <a:p>
             <a:r>
               <a:rPr lang="de-DE" baseline="0" dirty="0" smtClean="0"/>
-              <a:t>Daher muss in diesem Fall </a:t>
-            </a:r>
-            <a:r>
-              <a:rPr lang="de-DE" baseline="0" dirty="0" smtClean="0"/>
-              <a:t>die </a:t>
-            </a:r>
-            <a:r>
-              <a:rPr lang="de-DE" baseline="0" dirty="0" smtClean="0"/>
-              <a:t>Java </a:t>
+              <a:t>Daher muss in diesem Fall die Java </a:t>
             </a:r>
             <a:r>
               <a:rPr lang="de-DE" baseline="0" dirty="0" err="1" smtClean="0"/>
@@ -4051,11 +4034,7 @@
             </a:r>
             <a:r>
               <a:rPr lang="de-DE" baseline="0" dirty="0" smtClean="0"/>
-              <a:t> aktualisiert werden</a:t>
-            </a:r>
-            <a:r>
-              <a:rPr lang="de-DE" baseline="0" dirty="0" smtClean="0"/>
-              <a:t>. Dieser Schritt entfällt ggf. bei neueren Versionen von </a:t>
+              <a:t> aktualisiert werden. Dieser Schritt entfällt ggf. bei neueren Versionen von </a:t>
             </a:r>
             <a:r>
               <a:rPr lang="de-DE" baseline="0" dirty="0" err="1" smtClean="0"/>
@@ -4596,7 +4575,7 @@
           <a:p>
             <a:fld id="{E0E6D715-0E9C-42CB-A8A5-C6A1B14D9CED}" type="datetime1">
               <a:rPr lang="de-DE" smtClean="0"/>
-              <a:t>05.02.2019</a:t>
+              <a:t>13.03.2019</a:t>
             </a:fld>
             <a:endParaRPr lang="de-DE"/>
           </a:p>
@@ -4729,7 +4708,7 @@
           <a:p>
             <a:fld id="{B9591D92-8187-4DD6-AC71-31E3436F25C5}" type="datetime1">
               <a:rPr lang="de-DE" smtClean="0"/>
-              <a:t>05.02.2019</a:t>
+              <a:t>13.03.2019</a:t>
             </a:fld>
             <a:endParaRPr lang="de-DE"/>
           </a:p>
@@ -4996,7 +4975,7 @@
           <a:p>
             <a:fld id="{BDC70302-3C85-46B3-98B5-B69FEC2E6590}" type="datetime1">
               <a:rPr lang="de-DE" smtClean="0"/>
-              <a:t>05.02.2019</a:t>
+              <a:t>13.03.2019</a:t>
             </a:fld>
             <a:endParaRPr lang="de-DE"/>
           </a:p>
@@ -5177,7 +5156,7 @@
           <a:p>
             <a:fld id="{7D5B56B2-D457-4E31-80B7-12196762C138}" type="datetime1">
               <a:rPr lang="de-DE" smtClean="0"/>
-              <a:t>05.02.2019</a:t>
+              <a:t>13.03.2019</a:t>
             </a:fld>
             <a:endParaRPr lang="de-DE"/>
           </a:p>
@@ -5306,7 +5285,7 @@
           <a:p>
             <a:fld id="{9166A2A0-AB75-4B8B-9C44-252E79BC818D}" type="datetime1">
               <a:rPr lang="de-DE" smtClean="0"/>
-              <a:t>05.02.2019</a:t>
+              <a:t>13.03.2019</a:t>
             </a:fld>
             <a:endParaRPr lang="de-DE"/>
           </a:p>
@@ -5412,7 +5391,7 @@
           <a:p>
             <a:fld id="{D42DA1F8-015D-4474-B19D-56CC651D10D0}" type="datetime1">
               <a:rPr lang="de-DE" smtClean="0"/>
-              <a:t>05.02.2019</a:t>
+              <a:t>13.03.2019</a:t>
             </a:fld>
             <a:endParaRPr lang="de-DE"/>
           </a:p>
@@ -5545,7 +5524,7 @@
           <a:p>
             <a:fld id="{51D674AF-F1DB-4409-8F19-7975BC8E901C}" type="datetime1">
               <a:rPr lang="de-DE" smtClean="0"/>
-              <a:t>05.02.2019</a:t>
+              <a:t>13.03.2019</a:t>
             </a:fld>
             <a:endParaRPr lang="de-DE"/>
           </a:p>
@@ -5702,7 +5681,7 @@
           <a:p>
             <a:fld id="{96AAB97B-A604-4A9C-B6DE-8F7A44DFE716}" type="datetime1">
               <a:rPr lang="de-DE" smtClean="0"/>
-              <a:t>05.02.2019</a:t>
+              <a:t>13.03.2019</a:t>
             </a:fld>
             <a:endParaRPr lang="de-DE"/>
           </a:p>
@@ -5911,7 +5890,7 @@
           <a:p>
             <a:fld id="{3C6F0BD4-2E3D-4627-BA92-963207075914}" type="datetime1">
               <a:rPr lang="de-DE" smtClean="0"/>
-              <a:t>05.02.2019</a:t>
+              <a:t>13.03.2019</a:t>
             </a:fld>
             <a:endParaRPr lang="de-DE"/>
           </a:p>
@@ -6120,7 +6099,7 @@
           <a:p>
             <a:fld id="{E68F1924-4272-48F6-BFF6-190750DFCE5E}" type="datetime1">
               <a:rPr lang="de-DE" smtClean="0"/>
-              <a:t>05.02.2019</a:t>
+              <a:t>13.03.2019</a:t>
             </a:fld>
             <a:endParaRPr lang="de-DE"/>
           </a:p>
@@ -6545,7 +6524,7 @@
           <a:p>
             <a:fld id="{52EC57A5-12C9-41C1-AABD-4FE5C29A1C1E}" type="datetime1">
               <a:rPr lang="de-DE" smtClean="0"/>
-              <a:t>05.02.2019</a:t>
+              <a:t>13.03.2019</a:t>
             </a:fld>
             <a:endParaRPr lang="de-DE" dirty="0"/>
           </a:p>
@@ -7129,7 +7108,7 @@
           <a:p>
             <a:fld id="{9E0CC5F4-F29B-418E-9286-8A6D06A1E757}" type="datetime1">
               <a:rPr lang="de-DE" smtClean="0"/>
-              <a:t>05.02.2019</a:t>
+              <a:t>13.03.2019</a:t>
             </a:fld>
             <a:endParaRPr lang="de-DE" dirty="0"/>
           </a:p>
@@ -7772,7 +7751,7 @@
           <a:p>
             <a:fld id="{BF197B32-FA23-4358-98A7-EECA7E71BD41}" type="datetime1">
               <a:rPr lang="de-DE" smtClean="0"/>
-              <a:t>05.02.2019</a:t>
+              <a:t>13.03.2019</a:t>
             </a:fld>
             <a:endParaRPr lang="de-DE"/>
           </a:p>
@@ -7908,33 +7887,49 @@
           <a:lstStyle/>
           <a:p>
             <a:r>
-              <a:rPr lang="de-DE" dirty="0" smtClean="0"/>
+              <a:rPr lang="de-DE" dirty="0" smtClean="0">
+                <a:latin typeface="Consolas" panose="020B0609020204030204" pitchFamily="49" charset="0"/>
+              </a:rPr>
               <a:t>mv </a:t>
             </a:r>
             <a:r>
-              <a:rPr lang="de-DE" dirty="0" smtClean="0"/>
-              <a:t>pycharm-community-2018.3.4 </a:t>
-            </a:r>
-            <a:r>
-              <a:rPr lang="de-DE" dirty="0" err="1" smtClean="0"/>
+              <a:rPr lang="de-DE" dirty="0" smtClean="0">
+                <a:latin typeface="Consolas" panose="020B0609020204030204" pitchFamily="49" charset="0"/>
+              </a:rPr>
+              <a:t>pycharm-community-2018.3.5 </a:t>
+            </a:r>
+            <a:r>
+              <a:rPr lang="de-DE" dirty="0" err="1" smtClean="0">
+                <a:latin typeface="Consolas" panose="020B0609020204030204" pitchFamily="49" charset="0"/>
+              </a:rPr>
               <a:t>pycharm</a:t>
             </a:r>
-            <a:endParaRPr lang="de-DE" dirty="0" smtClean="0"/>
-          </a:p>
-          <a:p>
-            <a:r>
-              <a:rPr lang="de-DE" dirty="0" err="1" smtClean="0"/>
+            <a:endParaRPr lang="de-DE" dirty="0" smtClean="0">
+              <a:latin typeface="Consolas" panose="020B0609020204030204" pitchFamily="49" charset="0"/>
+            </a:endParaRPr>
+          </a:p>
+          <a:p>
+            <a:r>
+              <a:rPr lang="de-DE" dirty="0" err="1" smtClean="0">
+                <a:latin typeface="Consolas" panose="020B0609020204030204" pitchFamily="49" charset="0"/>
+              </a:rPr>
               <a:t>rm</a:t>
             </a:r>
             <a:r>
-              <a:rPr lang="de-DE" dirty="0" smtClean="0"/>
+              <a:rPr lang="de-DE" dirty="0" smtClean="0">
+                <a:latin typeface="Consolas" panose="020B0609020204030204" pitchFamily="49" charset="0"/>
+              </a:rPr>
               <a:t> </a:t>
             </a:r>
             <a:r>
-              <a:rPr lang="de-DE" dirty="0" smtClean="0"/>
-              <a:t>pycharm-community-2018.3.4.tar.gz</a:t>
-            </a:r>
-            <a:endParaRPr lang="de-DE" dirty="0" smtClean="0"/>
+              <a:rPr lang="de-DE" dirty="0" smtClean="0">
+                <a:latin typeface="Consolas" panose="020B0609020204030204" pitchFamily="49" charset="0"/>
+              </a:rPr>
+              <a:t>pycharm-community-2018.3.5.tar.gz</a:t>
+            </a:r>
+            <a:endParaRPr lang="de-DE" dirty="0" smtClean="0">
+              <a:latin typeface="Consolas" panose="020B0609020204030204" pitchFamily="49" charset="0"/>
+            </a:endParaRPr>
           </a:p>
           <a:p>
             <a:endParaRPr lang="de-DE" dirty="0"/>
@@ -7958,7 +7953,7 @@
           <a:p>
             <a:fld id="{7D5B56B2-D457-4E31-80B7-12196762C138}" type="datetime1">
               <a:rPr lang="de-DE" smtClean="0"/>
-              <a:t>05.02.2019</a:t>
+              <a:t>13.03.2019</a:t>
             </a:fld>
             <a:endParaRPr lang="de-DE"/>
           </a:p>
@@ -8094,21 +8089,29 @@
           <a:lstStyle/>
           <a:p>
             <a:r>
-              <a:rPr lang="de-DE" dirty="0"/>
+              <a:rPr lang="de-DE" dirty="0">
+                <a:latin typeface="Consolas" panose="020B0609020204030204" pitchFamily="49" charset="0"/>
+              </a:rPr>
               <a:t>cd </a:t>
             </a:r>
             <a:r>
-              <a:rPr lang="de-DE" dirty="0" err="1"/>
+              <a:rPr lang="de-DE" dirty="0" err="1">
+                <a:latin typeface="Consolas" panose="020B0609020204030204" pitchFamily="49" charset="0"/>
+              </a:rPr>
               <a:t>pycharm</a:t>
             </a:r>
             <a:r>
-              <a:rPr lang="de-DE" dirty="0"/>
+              <a:rPr lang="de-DE" dirty="0">
+                <a:latin typeface="Consolas" panose="020B0609020204030204" pitchFamily="49" charset="0"/>
+              </a:rPr>
               <a:t>/bin</a:t>
             </a:r>
           </a:p>
           <a:p>
             <a:r>
-              <a:rPr lang="de-DE" dirty="0"/>
+              <a:rPr lang="de-DE" dirty="0">
+                <a:latin typeface="Consolas" panose="020B0609020204030204" pitchFamily="49" charset="0"/>
+              </a:rPr>
               <a:t>./pycharm.sh</a:t>
             </a:r>
           </a:p>
@@ -8184,7 +8187,7 @@
           <a:p>
             <a:fld id="{7D5B56B2-D457-4E31-80B7-12196762C138}" type="datetime1">
               <a:rPr lang="de-DE" smtClean="0"/>
-              <a:t>05.02.2019</a:t>
+              <a:t>13.03.2019</a:t>
             </a:fld>
             <a:endParaRPr lang="de-DE"/>
           </a:p>
@@ -8343,14 +8346,39 @@
             <a:pPr lvl="1"/>
             <a:r>
               <a:rPr lang="de-DE" dirty="0" smtClean="0"/>
-              <a:t>Kommando: ~/pycharm/bin/pycharm.sh</a:t>
-            </a:r>
+              <a:t>Kommando: </a:t>
+            </a:r>
+            <a:r>
+              <a:rPr lang="de-DE" dirty="0" smtClean="0"/>
+              <a:t>/home/pi/pycharm/bin/pycharm.sh</a:t>
+            </a:r>
+            <a:endParaRPr lang="de-DE" dirty="0" smtClean="0"/>
           </a:p>
           <a:p>
             <a:pPr lvl="1"/>
             <a:r>
               <a:rPr lang="de-DE" dirty="0" smtClean="0"/>
-              <a:t>Icon: ~/</a:t>
+              <a:t>Icon: </a:t>
+            </a:r>
+            <a:r>
+              <a:rPr lang="de-DE" dirty="0" smtClean="0"/>
+              <a:t>/</a:t>
+            </a:r>
+            <a:r>
+              <a:rPr lang="de-DE" dirty="0" err="1" smtClean="0"/>
+              <a:t>home</a:t>
+            </a:r>
+            <a:r>
+              <a:rPr lang="de-DE" dirty="0" smtClean="0"/>
+              <a:t>/</a:t>
+            </a:r>
+            <a:r>
+              <a:rPr lang="de-DE" dirty="0" err="1" smtClean="0"/>
+              <a:t>pi</a:t>
+            </a:r>
+            <a:r>
+              <a:rPr lang="de-DE" dirty="0" smtClean="0"/>
+              <a:t>/</a:t>
             </a:r>
             <a:r>
               <a:rPr lang="de-DE" dirty="0" err="1" smtClean="0"/>
@@ -8360,6 +8388,7 @@
               <a:rPr lang="de-DE" dirty="0" smtClean="0"/>
               <a:t>/bin/pycharm.png</a:t>
             </a:r>
+            <a:endParaRPr lang="de-DE" dirty="0" smtClean="0"/>
           </a:p>
           <a:p>
             <a:pPr lvl="1"/>
@@ -8381,7 +8410,27 @@
             <a:pPr lvl="1"/>
             <a:r>
               <a:rPr lang="de-DE" dirty="0" smtClean="0"/>
-              <a:t>„Explorer“: ~/</a:t>
+              <a:t>„Explorer“: </a:t>
+            </a:r>
+            <a:r>
+              <a:rPr lang="de-DE" dirty="0" smtClean="0"/>
+              <a:t>/</a:t>
+            </a:r>
+            <a:r>
+              <a:rPr lang="de-DE" dirty="0" err="1" smtClean="0"/>
+              <a:t>home</a:t>
+            </a:r>
+            <a:r>
+              <a:rPr lang="de-DE" dirty="0" smtClean="0"/>
+              <a:t>/</a:t>
+            </a:r>
+            <a:r>
+              <a:rPr lang="de-DE" dirty="0" err="1" smtClean="0"/>
+              <a:t>pi</a:t>
+            </a:r>
+            <a:r>
+              <a:rPr lang="de-DE" dirty="0" smtClean="0"/>
+              <a:t>/</a:t>
             </a:r>
             <a:r>
               <a:rPr lang="de-DE" dirty="0" err="1" smtClean="0"/>
@@ -8389,7 +8438,11 @@
             </a:r>
             <a:r>
               <a:rPr lang="de-DE" dirty="0" smtClean="0"/>
-              <a:t>/bin öffnen</a:t>
+              <a:t>/bin </a:t>
+            </a:r>
+            <a:r>
+              <a:rPr lang="de-DE" dirty="0" smtClean="0"/>
+              <a:t>öffnen</a:t>
             </a:r>
           </a:p>
           <a:p>
@@ -8434,7 +8487,7 @@
           <a:p>
             <a:fld id="{7D5B56B2-D457-4E31-80B7-12196762C138}" type="datetime1">
               <a:rPr lang="de-DE" smtClean="0"/>
-              <a:t>05.02.2019</a:t>
+              <a:t>13.03.2019</a:t>
             </a:fld>
             <a:endParaRPr lang="de-DE"/>
           </a:p>
@@ -8738,7 +8791,7 @@
             <a:fld id="{1488C8F6-7948-499E-B3F3-545F5D44CC45}" type="datetime1">
               <a:rPr lang="de-DE" smtClean="0"/>
               <a:pPr/>
-              <a:t>05.02.2019</a:t>
+              <a:t>13.03.2019</a:t>
             </a:fld>
             <a:endParaRPr lang="de-DE" dirty="0"/>
           </a:p>
@@ -9126,7 +9179,7 @@
           <a:p>
             <a:fld id="{E1CC0198-1A73-46A9-99C9-76EB3EE8DB38}" type="datetime1">
               <a:rPr lang="de-DE" smtClean="0"/>
-              <a:t>05.02.2019</a:t>
+              <a:t>13.03.2019</a:t>
             </a:fld>
             <a:endParaRPr lang="de-DE" dirty="0"/>
           </a:p>
@@ -9293,7 +9346,7 @@
           <a:p>
             <a:fld id="{7D5B56B2-D457-4E31-80B7-12196762C138}" type="datetime1">
               <a:rPr lang="de-DE" smtClean="0"/>
-              <a:t>05.02.2019</a:t>
+              <a:t>13.03.2019</a:t>
             </a:fld>
             <a:endParaRPr lang="de-DE"/>
           </a:p>
@@ -9663,7 +9716,7 @@
           <a:p>
             <a:fld id="{978D60C7-52C0-4EAC-B41E-9B268717C8CE}" type="datetime1">
               <a:rPr lang="de-DE" smtClean="0"/>
-              <a:t>05.02.2019</a:t>
+              <a:t>13.03.2019</a:t>
             </a:fld>
             <a:endParaRPr lang="de-DE" dirty="0"/>
           </a:p>
@@ -9960,7 +10013,7 @@
           <a:p>
             <a:fld id="{978D60C7-52C0-4EAC-B41E-9B268717C8CE}" type="datetime1">
               <a:rPr lang="de-DE" smtClean="0"/>
-              <a:t>05.02.2019</a:t>
+              <a:t>13.03.2019</a:t>
             </a:fld>
             <a:endParaRPr lang="de-DE" dirty="0"/>
           </a:p>
@@ -10417,7 +10470,7 @@
           <a:p>
             <a:fld id="{3D1CC90E-5A3E-454C-93BC-C0FC350C62F6}" type="datetime1">
               <a:rPr lang="de-DE" smtClean="0"/>
-              <a:t>05.02.2019</a:t>
+              <a:t>13.03.2019</a:t>
             </a:fld>
             <a:endParaRPr lang="de-DE" dirty="0"/>
           </a:p>
@@ -10782,7 +10835,7 @@
           <a:p>
             <a:fld id="{7D5B56B2-D457-4E31-80B7-12196762C138}" type="datetime1">
               <a:rPr lang="de-DE" smtClean="0"/>
-              <a:t>05.02.2019</a:t>
+              <a:t>13.03.2019</a:t>
             </a:fld>
             <a:endParaRPr lang="de-DE"/>
           </a:p>
@@ -10960,7 +11013,7 @@
           <a:p>
             <a:fld id="{3864C030-6135-44B0-963A-565E8643FD94}" type="datetime1">
               <a:rPr lang="de-DE" smtClean="0"/>
-              <a:t>05.02.2019</a:t>
+              <a:t>13.03.2019</a:t>
             </a:fld>
             <a:endParaRPr lang="de-DE"/>
           </a:p>
@@ -11406,7 +11459,7 @@
           <a:p>
             <a:fld id="{20DC40FA-A22B-48BB-8D53-984419E13B62}" type="datetime1">
               <a:rPr lang="de-DE" smtClean="0"/>
-              <a:t>05.02.2019</a:t>
+              <a:t>13.03.2019</a:t>
             </a:fld>
             <a:endParaRPr lang="de-DE" dirty="0"/>
           </a:p>
@@ -11543,7 +11596,7 @@
           <a:p>
             <a:fld id="{0D12B559-D508-491C-BFE1-BF16B919FFF6}" type="datetime1">
               <a:rPr lang="de-DE" smtClean="0"/>
-              <a:t>05.02.2019</a:t>
+              <a:t>13.03.2019</a:t>
             </a:fld>
             <a:endParaRPr lang="de-DE" dirty="0"/>
           </a:p>
@@ -12150,7 +12203,7 @@
           <a:p>
             <a:fld id="{D78EC7EB-AE89-4914-855C-E625BCEB3644}" type="datetime1">
               <a:rPr lang="de-DE" smtClean="0"/>
-              <a:t>05.02.2019</a:t>
+              <a:t>13.03.2019</a:t>
             </a:fld>
             <a:endParaRPr lang="de-DE" dirty="0"/>
           </a:p>
@@ -12917,7 +12970,7 @@
           <a:p>
             <a:fld id="{63B1C509-C1F4-4BFF-9DD1-0423BA46D221}" type="datetime1">
               <a:rPr lang="de-DE" smtClean="0"/>
-              <a:t>05.02.2019</a:t>
+              <a:t>13.03.2019</a:t>
             </a:fld>
             <a:endParaRPr lang="de-DE" dirty="0"/>
           </a:p>
@@ -13054,7 +13107,7 @@
           <a:p>
             <a:fld id="{E8353813-5009-498F-9114-327FA5B64742}" type="datetime1">
               <a:rPr lang="de-DE" smtClean="0"/>
-              <a:t>05.02.2019</a:t>
+              <a:t>13.03.2019</a:t>
             </a:fld>
             <a:endParaRPr lang="de-DE" dirty="0"/>
           </a:p>
@@ -13466,7 +13519,7 @@
           <a:p>
             <a:fld id="{F1310D82-6A30-4DE3-A06C-4E48F3C2BA64}" type="datetime1">
               <a:rPr lang="de-DE" smtClean="0"/>
-              <a:t>05.02.2019</a:t>
+              <a:t>13.03.2019</a:t>
             </a:fld>
             <a:endParaRPr lang="de-DE"/>
           </a:p>
@@ -13653,7 +13706,7 @@
           <a:p>
             <a:fld id="{F1310D82-6A30-4DE3-A06C-4E48F3C2BA64}" type="datetime1">
               <a:rPr lang="de-DE" smtClean="0"/>
-              <a:t>05.02.2019</a:t>
+              <a:t>13.03.2019</a:t>
             </a:fld>
             <a:endParaRPr lang="de-DE"/>
           </a:p>
@@ -13814,7 +13867,7 @@
           <a:p>
             <a:fld id="{CBE1475B-97F9-4458-B0D2-C52B31AF1C9A}" type="datetime1">
               <a:rPr lang="de-DE" smtClean="0"/>
-              <a:t>05.02.2019</a:t>
+              <a:t>13.03.2019</a:t>
             </a:fld>
             <a:endParaRPr lang="de-DE"/>
           </a:p>
@@ -13992,7 +14045,7 @@
           <a:p>
             <a:fld id="{3C6F0BD4-2E3D-4627-BA92-963207075914}" type="datetime1">
               <a:rPr lang="de-DE" smtClean="0"/>
-              <a:t>05.02.2019</a:t>
+              <a:t>13.03.2019</a:t>
             </a:fld>
             <a:endParaRPr lang="de-DE"/>
           </a:p>
@@ -14192,7 +14245,7 @@
           <a:p>
             <a:fld id="{3C6F0BD4-2E3D-4627-BA92-963207075914}" type="datetime1">
               <a:rPr lang="de-DE" smtClean="0"/>
-              <a:t>05.02.2019</a:t>
+              <a:t>13.03.2019</a:t>
             </a:fld>
             <a:endParaRPr lang="de-DE"/>
           </a:p>
@@ -14432,7 +14485,7 @@
           <a:p>
             <a:fld id="{BDC70302-3C85-46B3-98B5-B69FEC2E6590}" type="datetime1">
               <a:rPr lang="de-DE" smtClean="0"/>
-              <a:t>05.02.2019</a:t>
+              <a:t>13.03.2019</a:t>
             </a:fld>
             <a:endParaRPr lang="de-DE"/>
           </a:p>
@@ -14775,7 +14828,7 @@
           <a:p>
             <a:fld id="{7D5B56B2-D457-4E31-80B7-12196762C138}" type="datetime1">
               <a:rPr lang="de-DE" smtClean="0"/>
-              <a:t>05.02.2019</a:t>
+              <a:t>13.03.2019</a:t>
             </a:fld>
             <a:endParaRPr lang="de-DE"/>
           </a:p>
@@ -15051,7 +15104,7 @@
           <a:p>
             <a:fld id="{7D5B56B2-D457-4E31-80B7-12196762C138}" type="datetime1">
               <a:rPr lang="de-DE" smtClean="0"/>
-              <a:t>05.02.2019</a:t>
+              <a:t>13.03.2019</a:t>
             </a:fld>
             <a:endParaRPr lang="de-DE"/>
           </a:p>
@@ -15113,11 +15166,11 @@
   <p:clrMapOvr>
     <a:masterClrMapping/>
   </p:clrMapOvr>
-  <mc:AlternateContent xmlns:mc="http://schemas.openxmlformats.org/markup-compatibility/2006">
-    <mc:Choice xmlns:p14="http://schemas.microsoft.com/office/powerpoint/2010/main" Requires="p14">
+  <mc:AlternateContent xmlns:mc="http://schemas.openxmlformats.org/markup-compatibility/2006" xmlns:p14="http://schemas.microsoft.com/office/powerpoint/2010/main">
+    <mc:Choice Requires="p14">
       <p:transition p14:dur="0"/>
     </mc:Choice>
-    <mc:Fallback>
+    <mc:Fallback xmlns="">
       <p:transition/>
     </mc:Fallback>
   </mc:AlternateContent>
@@ -15204,12 +15257,13 @@
               <a:rPr lang="de-DE" dirty="0" smtClean="0">
                 <a:hlinkClick r:id="rId3"/>
               </a:rPr>
-              <a:t>download.jetbrains.com/python/pycharm-community-2018.3.4.tar.gz</a:t>
+              <a:t>download.jetbrains.com/python/pycharm-community-2018.3.5.tar.gz</a:t>
             </a:r>
             <a:r>
               <a:rPr lang="de-DE" dirty="0" smtClean="0"/>
               <a:t> </a:t>
             </a:r>
+            <a:endParaRPr lang="de-DE" dirty="0" smtClean="0"/>
           </a:p>
           <a:p>
             <a:pPr lvl="1"/>
@@ -15263,7 +15317,7 @@
           <a:p>
             <a:fld id="{7D5B56B2-D457-4E31-80B7-12196762C138}" type="datetime1">
               <a:rPr lang="de-DE" smtClean="0"/>
-              <a:t>05.02.2019</a:t>
+              <a:t>13.03.2019</a:t>
             </a:fld>
             <a:endParaRPr lang="de-DE"/>
           </a:p>
@@ -15415,9 +15469,10 @@
               <a:t> </a:t>
             </a:r>
             <a:r>
-              <a:rPr lang="de-DE" dirty="0"/>
-              <a:t>pycharm-community-2018.3.4.tar.gz </a:t>
-            </a:r>
+              <a:rPr lang="de-DE" dirty="0" smtClean="0"/>
+              <a:t>pycharm-community-2018.3.5.tar.gz </a:t>
+            </a:r>
+            <a:endParaRPr lang="de-DE" dirty="0"/>
           </a:p>
           <a:p>
             <a:pPr lvl="1"/>
@@ -15491,7 +15546,7 @@
           <a:p>
             <a:fld id="{7D5B56B2-D457-4E31-80B7-12196762C138}" type="datetime1">
               <a:rPr lang="de-DE" smtClean="0"/>
-              <a:t>05.02.2019</a:t>
+              <a:t>13.03.2019</a:t>
             </a:fld>
             <a:endParaRPr lang="de-DE"/>
           </a:p>

</xml_diff>